<commit_message>
added zip directory and started adding zip archives.
</commit_message>
<xml_diff>
--- a/04_python_programming/images/python_scientific_stack_2017.pptx
+++ b/04_python_programming/images/python_scientific_stack_2017.pptx
@@ -5,11 +5,10 @@
     <p:sldMasterId id="2147483672" r:id="rId1"/>
   </p:sldMasterIdLst>
   <p:notesMasterIdLst>
-    <p:notesMasterId r:id="rId4"/>
+    <p:notesMasterId r:id="rId3"/>
   </p:notesMasterIdLst>
   <p:sldIdLst>
     <p:sldId id="257" r:id="rId2"/>
-    <p:sldId id="258" r:id="rId3"/>
   </p:sldIdLst>
   <p:sldSz cx="9144000" cy="6858000" type="letter"/>
   <p:notesSz cx="6858000" cy="9144000"/>
@@ -198,7 +197,7 @@
           <a:p>
             <a:fld id="{8270D4E0-7C4D-8F45-B653-BF612194DC0B}" type="datetimeFigureOut">
               <a:rPr lang="en-US" smtClean="0"/>
-              <a:t>11/7/17</a:t>
+              <a:t>11/29/17</a:t>
             </a:fld>
             <a:endParaRPr lang="en-US"/>
           </a:p>
@@ -555,95 +554,6 @@
 </p:notes>
 </file>
 
-<file path=ppt/notesSlides/notesSlide2.xml><?xml version="1.0" encoding="utf-8"?>
-<p:notes xmlns:a="http://schemas.openxmlformats.org/drawingml/2006/main" xmlns:r="http://schemas.openxmlformats.org/officeDocument/2006/relationships" xmlns:p="http://schemas.openxmlformats.org/presentationml/2006/main">
-  <p:cSld>
-    <p:spTree>
-      <p:nvGrpSpPr>
-        <p:cNvPr id="1" name=""/>
-        <p:cNvGrpSpPr/>
-        <p:nvPr/>
-      </p:nvGrpSpPr>
-      <p:grpSpPr>
-        <a:xfrm>
-          <a:off x="0" y="0"/>
-          <a:ext cx="0" cy="0"/>
-          <a:chOff x="0" y="0"/>
-          <a:chExt cx="0" cy="0"/>
-        </a:xfrm>
-      </p:grpSpPr>
-      <p:sp>
-        <p:nvSpPr>
-          <p:cNvPr id="2" name="Slide Image Placeholder 1"/>
-          <p:cNvSpPr>
-            <a:spLocks noGrp="1" noRot="1" noChangeAspect="1"/>
-          </p:cNvSpPr>
-          <p:nvPr>
-            <p:ph type="sldImg"/>
-          </p:nvPr>
-        </p:nvSpPr>
-        <p:spPr>
-          <a:xfrm>
-            <a:off x="1371600" y="1143000"/>
-            <a:ext cx="4114800" cy="3086100"/>
-          </a:xfrm>
-        </p:spPr>
-      </p:sp>
-      <p:sp>
-        <p:nvSpPr>
-          <p:cNvPr id="3" name="Notes Placeholder 2"/>
-          <p:cNvSpPr>
-            <a:spLocks noGrp="1"/>
-          </p:cNvSpPr>
-          <p:nvPr>
-            <p:ph type="body" idx="1"/>
-          </p:nvPr>
-        </p:nvSpPr>
-        <p:spPr/>
-        <p:txBody>
-          <a:bodyPr/>
-          <a:lstStyle/>
-          <a:p>
-            <a:endParaRPr lang="en-US"/>
-          </a:p>
-        </p:txBody>
-      </p:sp>
-      <p:sp>
-        <p:nvSpPr>
-          <p:cNvPr id="4" name="Slide Number Placeholder 3"/>
-          <p:cNvSpPr>
-            <a:spLocks noGrp="1"/>
-          </p:cNvSpPr>
-          <p:nvPr>
-            <p:ph type="sldNum" sz="quarter" idx="10"/>
-          </p:nvPr>
-        </p:nvSpPr>
-        <p:spPr/>
-        <p:txBody>
-          <a:bodyPr/>
-          <a:lstStyle/>
-          <a:p>
-            <a:fld id="{E8C8E084-2F9B-FD49-A886-3DC6C12F9BB5}" type="slidenum">
-              <a:rPr lang="en-US" smtClean="0"/>
-              <a:t>2</a:t>
-            </a:fld>
-            <a:endParaRPr lang="en-US"/>
-          </a:p>
-        </p:txBody>
-      </p:sp>
-    </p:spTree>
-    <p:extLst>
-      <p:ext uri="{BB962C8B-B14F-4D97-AF65-F5344CB8AC3E}">
-        <p14:creationId xmlns:p14="http://schemas.microsoft.com/office/powerpoint/2010/main" val="1107843752"/>
-      </p:ext>
-    </p:extLst>
-  </p:cSld>
-  <p:clrMapOvr>
-    <a:masterClrMapping/>
-  </p:clrMapOvr>
-</p:notes>
-</file>
-
 <file path=ppt/slideLayouts/slideLayout1.xml><?xml version="1.0" encoding="utf-8"?>
 <p:sldLayout xmlns:a="http://schemas.openxmlformats.org/drawingml/2006/main" xmlns:r="http://schemas.openxmlformats.org/officeDocument/2006/relationships" xmlns:p="http://schemas.openxmlformats.org/presentationml/2006/main" type="title" preserve="1">
   <p:cSld name="Title Slide">
@@ -775,7 +685,7 @@
           <a:p>
             <a:fld id="{93FA284E-914D-4046-B832-5841AEFD3D3C}" type="datetimeFigureOut">
               <a:rPr lang="en-US" smtClean="0"/>
-              <a:t>11/7/17</a:t>
+              <a:t>11/29/17</a:t>
             </a:fld>
             <a:endParaRPr lang="en-US"/>
           </a:p>
@@ -940,7 +850,7 @@
           <a:p>
             <a:fld id="{93FA284E-914D-4046-B832-5841AEFD3D3C}" type="datetimeFigureOut">
               <a:rPr lang="en-US" smtClean="0"/>
-              <a:t>11/7/17</a:t>
+              <a:t>11/29/17</a:t>
             </a:fld>
             <a:endParaRPr lang="en-US"/>
           </a:p>
@@ -1115,7 +1025,7 @@
           <a:p>
             <a:fld id="{93FA284E-914D-4046-B832-5841AEFD3D3C}" type="datetimeFigureOut">
               <a:rPr lang="en-US" smtClean="0"/>
-              <a:t>11/7/17</a:t>
+              <a:t>11/29/17</a:t>
             </a:fld>
             <a:endParaRPr lang="en-US"/>
           </a:p>
@@ -1280,7 +1190,7 @@
           <a:p>
             <a:fld id="{93FA284E-914D-4046-B832-5841AEFD3D3C}" type="datetimeFigureOut">
               <a:rPr lang="en-US" smtClean="0"/>
-              <a:t>11/7/17</a:t>
+              <a:t>11/29/17</a:t>
             </a:fld>
             <a:endParaRPr lang="en-US"/>
           </a:p>
@@ -1519,7 +1429,7 @@
           <a:p>
             <a:fld id="{93FA284E-914D-4046-B832-5841AEFD3D3C}" type="datetimeFigureOut">
               <a:rPr lang="en-US" smtClean="0"/>
-              <a:t>11/7/17</a:t>
+              <a:t>11/29/17</a:t>
             </a:fld>
             <a:endParaRPr lang="en-US"/>
           </a:p>
@@ -1746,7 +1656,7 @@
           <a:p>
             <a:fld id="{93FA284E-914D-4046-B832-5841AEFD3D3C}" type="datetimeFigureOut">
               <a:rPr lang="en-US" smtClean="0"/>
-              <a:t>11/7/17</a:t>
+              <a:t>11/29/17</a:t>
             </a:fld>
             <a:endParaRPr lang="en-US"/>
           </a:p>
@@ -2108,7 +2018,7 @@
           <a:p>
             <a:fld id="{93FA284E-914D-4046-B832-5841AEFD3D3C}" type="datetimeFigureOut">
               <a:rPr lang="en-US" smtClean="0"/>
-              <a:t>11/7/17</a:t>
+              <a:t>11/29/17</a:t>
             </a:fld>
             <a:endParaRPr lang="en-US"/>
           </a:p>
@@ -2221,7 +2131,7 @@
           <a:p>
             <a:fld id="{93FA284E-914D-4046-B832-5841AEFD3D3C}" type="datetimeFigureOut">
               <a:rPr lang="en-US" smtClean="0"/>
-              <a:t>11/7/17</a:t>
+              <a:t>11/29/17</a:t>
             </a:fld>
             <a:endParaRPr lang="en-US"/>
           </a:p>
@@ -2311,7 +2221,7 @@
           <a:p>
             <a:fld id="{93FA284E-914D-4046-B832-5841AEFD3D3C}" type="datetimeFigureOut">
               <a:rPr lang="en-US" smtClean="0"/>
-              <a:t>11/7/17</a:t>
+              <a:t>11/29/17</a:t>
             </a:fld>
             <a:endParaRPr lang="en-US"/>
           </a:p>
@@ -2583,7 +2493,7 @@
           <a:p>
             <a:fld id="{93FA284E-914D-4046-B832-5841AEFD3D3C}" type="datetimeFigureOut">
               <a:rPr lang="en-US" smtClean="0"/>
-              <a:t>11/7/17</a:t>
+              <a:t>11/29/17</a:t>
             </a:fld>
             <a:endParaRPr lang="en-US"/>
           </a:p>
@@ -2835,7 +2745,7 @@
           <a:p>
             <a:fld id="{93FA284E-914D-4046-B832-5841AEFD3D3C}" type="datetimeFigureOut">
               <a:rPr lang="en-US" smtClean="0"/>
-              <a:t>11/7/17</a:t>
+              <a:t>11/29/17</a:t>
             </a:fld>
             <a:endParaRPr lang="en-US"/>
           </a:p>
@@ -3043,7 +2953,7 @@
           <a:p>
             <a:fld id="{93FA284E-914D-4046-B832-5841AEFD3D3C}" type="datetimeFigureOut">
               <a:rPr lang="en-US" smtClean="0"/>
-              <a:t>11/7/17</a:t>
+              <a:t>11/29/17</a:t>
             </a:fld>
             <a:endParaRPr lang="en-US"/>
           </a:p>
@@ -3566,144 +3476,13 @@
   <p:clrMapOvr>
     <a:masterClrMapping/>
   </p:clrMapOvr>
-</p:sld>
-</file>
-
-<file path=ppt/slides/slide2.xml><?xml version="1.0" encoding="utf-8"?>
-<p:sld xmlns:a="http://schemas.openxmlformats.org/drawingml/2006/main" xmlns:r="http://schemas.openxmlformats.org/officeDocument/2006/relationships" xmlns:p="http://schemas.openxmlformats.org/presentationml/2006/main">
-  <p:cSld>
-    <p:spTree>
-      <p:nvGrpSpPr>
-        <p:cNvPr id="1" name=""/>
-        <p:cNvGrpSpPr/>
-        <p:nvPr/>
-      </p:nvGrpSpPr>
-      <p:grpSpPr>
-        <a:xfrm>
-          <a:off x="0" y="0"/>
-          <a:ext cx="0" cy="0"/>
-          <a:chOff x="0" y="0"/>
-          <a:chExt cx="0" cy="0"/>
-        </a:xfrm>
-      </p:grpSpPr>
-      <p:pic>
-        <p:nvPicPr>
-          <p:cNvPr id="2" name="Picture 1"/>
-          <p:cNvPicPr>
-            <a:picLocks noChangeAspect="1"/>
-          </p:cNvPicPr>
-          <p:nvPr/>
-        </p:nvPicPr>
-        <p:blipFill>
-          <a:blip r:embed="rId3">
-            <a:extLst>
-              <a:ext uri="{28A0092B-C50C-407E-A947-70E740481C1C}">
-                <a14:useLocalDpi xmlns:a14="http://schemas.microsoft.com/office/drawing/2010/main" val="0"/>
-              </a:ext>
-            </a:extLst>
-          </a:blip>
-          <a:stretch>
-            <a:fillRect/>
-          </a:stretch>
-        </p:blipFill>
-        <p:spPr>
-          <a:xfrm>
-            <a:off x="-12700" y="0"/>
-            <a:ext cx="9164782" cy="6858000"/>
-          </a:xfrm>
-          <a:prstGeom prst="rect">
-            <a:avLst/>
-          </a:prstGeom>
-        </p:spPr>
-      </p:pic>
-      <p:sp>
-        <p:nvSpPr>
-          <p:cNvPr id="3" name="Rectangle 2"/>
-          <p:cNvSpPr/>
-          <p:nvPr/>
-        </p:nvSpPr>
-        <p:spPr>
-          <a:xfrm>
-            <a:off x="1253068" y="165101"/>
-            <a:ext cx="2404533" cy="829733"/>
-          </a:xfrm>
-          <a:prstGeom prst="rect">
-            <a:avLst/>
-          </a:prstGeom>
-          <a:solidFill>
-            <a:schemeClr val="bg1"/>
-          </a:solidFill>
-          <a:ln>
-            <a:solidFill>
-              <a:schemeClr val="bg1"/>
-            </a:solidFill>
-          </a:ln>
-        </p:spPr>
-        <p:style>
-          <a:lnRef idx="2">
-            <a:schemeClr val="accent1">
-              <a:shade val="50000"/>
-            </a:schemeClr>
-          </a:lnRef>
-          <a:fillRef idx="1">
-            <a:schemeClr val="accent1"/>
-          </a:fillRef>
-          <a:effectRef idx="0">
-            <a:schemeClr val="accent1"/>
-          </a:effectRef>
-          <a:fontRef idx="minor">
-            <a:schemeClr val="lt1"/>
-          </a:fontRef>
-        </p:style>
-        <p:txBody>
-          <a:bodyPr rtlCol="0" anchor="ctr"/>
-          <a:lstStyle/>
-          <a:p>
-            <a:pPr algn="ctr"/>
-            <a:endParaRPr lang="en-US"/>
-          </a:p>
-        </p:txBody>
-      </p:sp>
-      <p:pic>
-        <p:nvPicPr>
-          <p:cNvPr id="4" name="Picture 3"/>
-          <p:cNvPicPr>
-            <a:picLocks noChangeAspect="1"/>
-          </p:cNvPicPr>
-          <p:nvPr/>
-        </p:nvPicPr>
-        <p:blipFill>
-          <a:blip r:embed="rId4">
-            <a:extLst>
-              <a:ext uri="{28A0092B-C50C-407E-A947-70E740481C1C}">
-                <a14:useLocalDpi xmlns:a14="http://schemas.microsoft.com/office/drawing/2010/main" val="0"/>
-              </a:ext>
-            </a:extLst>
-          </a:blip>
-          <a:stretch>
-            <a:fillRect/>
-          </a:stretch>
-        </p:blipFill>
-        <p:spPr>
-          <a:xfrm>
-            <a:off x="1401236" y="1"/>
-            <a:ext cx="1824567" cy="1216378"/>
-          </a:xfrm>
-          <a:prstGeom prst="rect">
-            <a:avLst/>
-          </a:prstGeom>
-        </p:spPr>
-      </p:pic>
-    </p:spTree>
-    <p:extLst>
-      <p:ext uri="{BB962C8B-B14F-4D97-AF65-F5344CB8AC3E}">
-        <p14:creationId xmlns:p14="http://schemas.microsoft.com/office/powerpoint/2010/main" val="999890961"/>
-      </p:ext>
-    </p:extLst>
-  </p:cSld>
-  <p:clrMapOvr>
-    <a:masterClrMapping/>
-  </p:clrMapOvr>
+  <p:timing>
+    <p:tnLst>
+      <p:par>
+        <p:cTn id="1" dur="indefinite" restart="never" nodeType="tmRoot"/>
+      </p:par>
+    </p:tnLst>
+  </p:timing>
 </p:sld>
 </file>
 

</xml_diff>